<commit_message>
Modifications after test run
</commit_message>
<xml_diff>
--- a/The Library Problem.pptx
+++ b/The Library Problem.pptx
@@ -273,7 +273,7 @@
           <a:p>
             <a:fld id="{28AE68A4-6830-473E-9B22-9CB76D6D632B}" type="datetimeFigureOut">
               <a:rPr lang="en-US" smtClean="0"/>
-              <a:t>12/7/2017</a:t>
+              <a:t>12/10/2017</a:t>
             </a:fld>
             <a:endParaRPr lang="en-US"/>
           </a:p>
@@ -471,7 +471,7 @@
           <a:p>
             <a:fld id="{28AE68A4-6830-473E-9B22-9CB76D6D632B}" type="datetimeFigureOut">
               <a:rPr lang="en-US" smtClean="0"/>
-              <a:t>12/7/2017</a:t>
+              <a:t>12/10/2017</a:t>
             </a:fld>
             <a:endParaRPr lang="en-US"/>
           </a:p>
@@ -679,7 +679,7 @@
           <a:p>
             <a:fld id="{28AE68A4-6830-473E-9B22-9CB76D6D632B}" type="datetimeFigureOut">
               <a:rPr lang="en-US" smtClean="0"/>
-              <a:t>12/7/2017</a:t>
+              <a:t>12/10/2017</a:t>
             </a:fld>
             <a:endParaRPr lang="en-US"/>
           </a:p>
@@ -877,7 +877,7 @@
           <a:p>
             <a:fld id="{28AE68A4-6830-473E-9B22-9CB76D6D632B}" type="datetimeFigureOut">
               <a:rPr lang="en-US" smtClean="0"/>
-              <a:t>12/7/2017</a:t>
+              <a:t>12/10/2017</a:t>
             </a:fld>
             <a:endParaRPr lang="en-US"/>
           </a:p>
@@ -1152,7 +1152,7 @@
           <a:p>
             <a:fld id="{28AE68A4-6830-473E-9B22-9CB76D6D632B}" type="datetimeFigureOut">
               <a:rPr lang="en-US" smtClean="0"/>
-              <a:t>12/7/2017</a:t>
+              <a:t>12/10/2017</a:t>
             </a:fld>
             <a:endParaRPr lang="en-US"/>
           </a:p>
@@ -1417,7 +1417,7 @@
           <a:p>
             <a:fld id="{28AE68A4-6830-473E-9B22-9CB76D6D632B}" type="datetimeFigureOut">
               <a:rPr lang="en-US" smtClean="0"/>
-              <a:t>12/7/2017</a:t>
+              <a:t>12/10/2017</a:t>
             </a:fld>
             <a:endParaRPr lang="en-US"/>
           </a:p>
@@ -1829,7 +1829,7 @@
           <a:p>
             <a:fld id="{28AE68A4-6830-473E-9B22-9CB76D6D632B}" type="datetimeFigureOut">
               <a:rPr lang="en-US" smtClean="0"/>
-              <a:t>12/7/2017</a:t>
+              <a:t>12/10/2017</a:t>
             </a:fld>
             <a:endParaRPr lang="en-US"/>
           </a:p>
@@ -1970,7 +1970,7 @@
           <a:p>
             <a:fld id="{28AE68A4-6830-473E-9B22-9CB76D6D632B}" type="datetimeFigureOut">
               <a:rPr lang="en-US" smtClean="0"/>
-              <a:t>12/7/2017</a:t>
+              <a:t>12/10/2017</a:t>
             </a:fld>
             <a:endParaRPr lang="en-US"/>
           </a:p>
@@ -2083,7 +2083,7 @@
           <a:p>
             <a:fld id="{28AE68A4-6830-473E-9B22-9CB76D6D632B}" type="datetimeFigureOut">
               <a:rPr lang="en-US" smtClean="0"/>
-              <a:t>12/7/2017</a:t>
+              <a:t>12/10/2017</a:t>
             </a:fld>
             <a:endParaRPr lang="en-US"/>
           </a:p>
@@ -2394,7 +2394,7 @@
           <a:p>
             <a:fld id="{28AE68A4-6830-473E-9B22-9CB76D6D632B}" type="datetimeFigureOut">
               <a:rPr lang="en-US" smtClean="0"/>
-              <a:t>12/7/2017</a:t>
+              <a:t>12/10/2017</a:t>
             </a:fld>
             <a:endParaRPr lang="en-US"/>
           </a:p>
@@ -2682,7 +2682,7 @@
           <a:p>
             <a:fld id="{28AE68A4-6830-473E-9B22-9CB76D6D632B}" type="datetimeFigureOut">
               <a:rPr lang="en-US" smtClean="0"/>
-              <a:t>12/7/2017</a:t>
+              <a:t>12/10/2017</a:t>
             </a:fld>
             <a:endParaRPr lang="en-US"/>
           </a:p>
@@ -2923,7 +2923,7 @@
           <a:p>
             <a:fld id="{28AE68A4-6830-473E-9B22-9CB76D6D632B}" type="datetimeFigureOut">
               <a:rPr lang="en-US" smtClean="0"/>
-              <a:t>12/7/2017</a:t>
+              <a:t>12/10/2017</a:t>
             </a:fld>
             <a:endParaRPr lang="en-US"/>
           </a:p>
@@ -3412,6 +3412,13 @@
   <p:clrMapOvr>
     <a:masterClrMapping/>
   </p:clrMapOvr>
+  <p:timing>
+    <p:tnLst>
+      <p:par>
+        <p:cTn id="1" dur="indefinite" restart="never" nodeType="tmRoot"/>
+      </p:par>
+    </p:tnLst>
+  </p:timing>
 </p:sld>
 </file>
 
@@ -3490,7 +3497,15 @@
           <a:p>
             <a:r>
               <a:rPr lang="en-US" dirty="0"/>
-              <a:t>If the original data were collected by checked in, checked out pairs, how do we create the data we want?</a:t>
+              <a:t>If the original data were collected by </a:t>
+            </a:r>
+            <a:r>
+              <a:rPr lang="en-US" smtClean="0"/>
+              <a:t>individual book logs, </a:t>
+            </a:r>
+            <a:r>
+              <a:rPr lang="en-US" dirty="0"/>
+              <a:t>how do we create the data we want?</a:t>
             </a:r>
           </a:p>
           <a:p>
@@ -3511,6 +3526,13 @@
   <p:clrMapOvr>
     <a:masterClrMapping/>
   </p:clrMapOvr>
+  <p:timing>
+    <p:tnLst>
+      <p:par>
+        <p:cTn id="1" dur="indefinite" restart="never" nodeType="tmRoot"/>
+      </p:par>
+    </p:tnLst>
+  </p:timing>
 </p:sld>
 </file>
 
@@ -3594,6 +3616,13 @@
   <p:clrMapOvr>
     <a:masterClrMapping/>
   </p:clrMapOvr>
+  <p:timing>
+    <p:tnLst>
+      <p:par>
+        <p:cTn id="1" dur="indefinite" restart="never" nodeType="tmRoot"/>
+      </p:par>
+    </p:tnLst>
+  </p:timing>
 </p:sld>
 </file>
 
@@ -3716,6 +3745,13 @@
   <p:clrMapOvr>
     <a:masterClrMapping/>
   </p:clrMapOvr>
+  <p:timing>
+    <p:tnLst>
+      <p:par>
+        <p:cTn id="1" dur="indefinite" restart="never" nodeType="tmRoot"/>
+      </p:par>
+    </p:tnLst>
+  </p:timing>
 </p:sld>
 </file>
 
@@ -3820,6 +3856,13 @@
   <p:clrMapOvr>
     <a:masterClrMapping/>
   </p:clrMapOvr>
+  <p:timing>
+    <p:tnLst>
+      <p:par>
+        <p:cTn id="1" dur="indefinite" restart="never" nodeType="tmRoot"/>
+      </p:par>
+    </p:tnLst>
+  </p:timing>
 </p:sld>
 </file>
 
@@ -3967,6 +4010,13 @@
   <p:clrMapOvr>
     <a:masterClrMapping/>
   </p:clrMapOvr>
+  <p:timing>
+    <p:tnLst>
+      <p:par>
+        <p:cTn id="1" dur="indefinite" restart="never" nodeType="tmRoot"/>
+      </p:par>
+    </p:tnLst>
+  </p:timing>
 </p:sld>
 </file>
 
@@ -4073,6 +4123,13 @@
   <p:clrMapOvr>
     <a:masterClrMapping/>
   </p:clrMapOvr>
+  <p:timing>
+    <p:tnLst>
+      <p:par>
+        <p:cTn id="1" dur="indefinite" restart="never" nodeType="tmRoot"/>
+      </p:par>
+    </p:tnLst>
+  </p:timing>
 </p:sld>
 </file>
 
@@ -4156,6 +4213,13 @@
   <p:clrMapOvr>
     <a:masterClrMapping/>
   </p:clrMapOvr>
+  <p:timing>
+    <p:tnLst>
+      <p:par>
+        <p:cTn id="1" dur="indefinite" restart="never" nodeType="tmRoot"/>
+      </p:par>
+    </p:tnLst>
+  </p:timing>
 </p:sld>
 </file>
 
@@ -4198,9 +4262,10 @@
           <a:lstStyle/>
           <a:p>
             <a:r>
-              <a:rPr lang="en-US" dirty="0"/>
-              <a:t>More Questions</a:t>
-            </a:r>
+              <a:rPr lang="en-US" dirty="0" smtClean="0"/>
+              <a:t>Questions?</a:t>
+            </a:r>
+            <a:endParaRPr lang="en-US" dirty="0"/>
           </a:p>
         </p:txBody>
       </p:sp>
@@ -4264,6 +4329,13 @@
   <p:clrMapOvr>
     <a:masterClrMapping/>
   </p:clrMapOvr>
+  <p:timing>
+    <p:tnLst>
+      <p:par>
+        <p:cTn id="1" dur="indefinite" restart="never" nodeType="tmRoot"/>
+      </p:par>
+    </p:tnLst>
+  </p:timing>
 </p:sld>
 </file>
 
@@ -4416,6 +4488,13 @@
   <p:clrMapOvr>
     <a:masterClrMapping/>
   </p:clrMapOvr>
+  <p:timing>
+    <p:tnLst>
+      <p:par>
+        <p:cTn id="1" dur="indefinite" restart="never" nodeType="tmRoot"/>
+      </p:par>
+    </p:tnLst>
+  </p:timing>
 </p:sld>
 </file>
 
@@ -5038,6 +5117,13 @@
   <p:clrMapOvr>
     <a:masterClrMapping/>
   </p:clrMapOvr>
+  <p:timing>
+    <p:tnLst>
+      <p:par>
+        <p:cTn id="1" dur="indefinite" restart="never" nodeType="tmRoot"/>
+      </p:par>
+    </p:tnLst>
+  </p:timing>
 </p:sld>
 </file>
 

</xml_diff>